<commit_message>
Atualizar assinatura com celular
</commit_message>
<xml_diff>
--- a/Assinatura e-mail Schwarz com Celular.pptx
+++ b/Assinatura e-mail Schwarz com Celular.pptx
@@ -14,16 +14,18 @@
   <p:notesSz cx="6858000" cy="9144000"/>
   <p:embeddedFontLst>
     <p:embeddedFont>
-      <p:font typeface="Montserrat Classic" panose="020B0604020202020204" charset="0"/>
+      <p:font typeface="Montserrat Medium" panose="00000600000000000000" pitchFamily="2" charset="0"/>
       <p:regular r:id="rId4"/>
+      <p:italic r:id="rId5"/>
     </p:embeddedFont>
     <p:embeddedFont>
-      <p:font typeface="Montserrat Semi-Bold Bold" panose="020B0604020202020204" charset="0"/>
-      <p:regular r:id="rId5"/>
+      <p:font typeface="Montserrat SemiBold" panose="00000700000000000000" pitchFamily="2" charset="0"/>
+      <p:bold r:id="rId6"/>
+      <p:boldItalic r:id="rId7"/>
     </p:embeddedFont>
     <p:embeddedFont>
-      <p:font typeface="Pathway Gothic One" panose="020B0604020202020204" charset="0"/>
-      <p:regular r:id="rId6"/>
+      <p:font typeface="Pathway Gothic One" pitchFamily="2" charset="0"/>
+      <p:regular r:id="rId8"/>
     </p:embeddedFont>
   </p:embeddedFontLst>
   <p:defaultTextStyle>
@@ -222,7 +224,7 @@
           <a:p>
             <a:fld id="{0033826D-BF54-438B-9707-919959F77F61}" type="datetimeFigureOut">
               <a:rPr lang="pt-BR" smtClean="0"/>
-              <a:t>04/09/2024</a:t>
+              <a:t>22/11/2024</a:t>
             </a:fld>
             <a:endParaRPr lang="pt-BR"/>
           </a:p>
@@ -753,7 +755,7 @@
             <a:fld id="{1D8BD707-D9CF-40AE-B4C6-C98DA3205C09}" type="datetimeFigureOut">
               <a:rPr lang="en-US" smtClean="0"/>
               <a:pPr/>
-              <a:t>9/4/2024</a:t>
+              <a:t>11/22/2024</a:t>
             </a:fld>
             <a:endParaRPr lang="en-US"/>
           </a:p>
@@ -918,7 +920,7 @@
             <a:fld id="{1D8BD707-D9CF-40AE-B4C6-C98DA3205C09}" type="datetimeFigureOut">
               <a:rPr lang="en-US" smtClean="0"/>
               <a:pPr/>
-              <a:t>9/4/2024</a:t>
+              <a:t>11/22/2024</a:t>
             </a:fld>
             <a:endParaRPr lang="en-US"/>
           </a:p>
@@ -1093,7 +1095,7 @@
             <a:fld id="{1D8BD707-D9CF-40AE-B4C6-C98DA3205C09}" type="datetimeFigureOut">
               <a:rPr lang="en-US" smtClean="0"/>
               <a:pPr/>
-              <a:t>9/4/2024</a:t>
+              <a:t>11/22/2024</a:t>
             </a:fld>
             <a:endParaRPr lang="en-US"/>
           </a:p>
@@ -1258,7 +1260,7 @@
             <a:fld id="{1D8BD707-D9CF-40AE-B4C6-C98DA3205C09}" type="datetimeFigureOut">
               <a:rPr lang="en-US" smtClean="0"/>
               <a:pPr/>
-              <a:t>9/4/2024</a:t>
+              <a:t>11/22/2024</a:t>
             </a:fld>
             <a:endParaRPr lang="en-US"/>
           </a:p>
@@ -1500,7 +1502,7 @@
             <a:fld id="{1D8BD707-D9CF-40AE-B4C6-C98DA3205C09}" type="datetimeFigureOut">
               <a:rPr lang="en-US" smtClean="0"/>
               <a:pPr/>
-              <a:t>9/4/2024</a:t>
+              <a:t>11/22/2024</a:t>
             </a:fld>
             <a:endParaRPr lang="en-US"/>
           </a:p>
@@ -1782,7 +1784,7 @@
             <a:fld id="{1D8BD707-D9CF-40AE-B4C6-C98DA3205C09}" type="datetimeFigureOut">
               <a:rPr lang="en-US" smtClean="0"/>
               <a:pPr/>
-              <a:t>9/4/2024</a:t>
+              <a:t>11/22/2024</a:t>
             </a:fld>
             <a:endParaRPr lang="en-US"/>
           </a:p>
@@ -2198,7 +2200,7 @@
             <a:fld id="{1D8BD707-D9CF-40AE-B4C6-C98DA3205C09}" type="datetimeFigureOut">
               <a:rPr lang="en-US" smtClean="0"/>
               <a:pPr/>
-              <a:t>9/4/2024</a:t>
+              <a:t>11/22/2024</a:t>
             </a:fld>
             <a:endParaRPr lang="en-US"/>
           </a:p>
@@ -2312,7 +2314,7 @@
             <a:fld id="{1D8BD707-D9CF-40AE-B4C6-C98DA3205C09}" type="datetimeFigureOut">
               <a:rPr lang="en-US" smtClean="0"/>
               <a:pPr/>
-              <a:t>9/4/2024</a:t>
+              <a:t>11/22/2024</a:t>
             </a:fld>
             <a:endParaRPr lang="en-US"/>
           </a:p>
@@ -2404,7 +2406,7 @@
             <a:fld id="{1D8BD707-D9CF-40AE-B4C6-C98DA3205C09}" type="datetimeFigureOut">
               <a:rPr lang="en-US" smtClean="0"/>
               <a:pPr/>
-              <a:t>9/4/2024</a:t>
+              <a:t>11/22/2024</a:t>
             </a:fld>
             <a:endParaRPr lang="en-US"/>
           </a:p>
@@ -2676,7 +2678,7 @@
             <a:fld id="{1D8BD707-D9CF-40AE-B4C6-C98DA3205C09}" type="datetimeFigureOut">
               <a:rPr lang="en-US" smtClean="0"/>
               <a:pPr/>
-              <a:t>9/4/2024</a:t>
+              <a:t>11/22/2024</a:t>
             </a:fld>
             <a:endParaRPr lang="en-US"/>
           </a:p>
@@ -2925,7 +2927,7 @@
             <a:fld id="{1D8BD707-D9CF-40AE-B4C6-C98DA3205C09}" type="datetimeFigureOut">
               <a:rPr lang="en-US" smtClean="0"/>
               <a:pPr/>
-              <a:t>9/4/2024</a:t>
+              <a:t>11/22/2024</a:t>
             </a:fld>
             <a:endParaRPr lang="en-US"/>
           </a:p>
@@ -3133,7 +3135,7 @@
             <a:fld id="{1D8BD707-D9CF-40AE-B4C6-C98DA3205C09}" type="datetimeFigureOut">
               <a:rPr lang="en-US" smtClean="0"/>
               <a:pPr/>
-              <a:t>9/4/2024</a:t>
+              <a:t>11/22/2024</a:t>
             </a:fld>
             <a:endParaRPr lang="en-US"/>
           </a:p>
@@ -3512,7 +3514,7 @@
         </p:nvSpPr>
         <p:spPr>
           <a:xfrm>
-            <a:off x="1388762" y="34494"/>
+            <a:off x="1035844" y="34494"/>
             <a:ext cx="5034" cy="1296000"/>
           </a:xfrm>
           <a:custGeom>
@@ -3698,8 +3700,8 @@
         </p:nvSpPr>
         <p:spPr>
           <a:xfrm>
-            <a:off x="16218" y="488690"/>
-            <a:ext cx="1321908" cy="415545"/>
+            <a:off x="25438" y="537893"/>
+            <a:ext cx="981163" cy="309594"/>
           </a:xfrm>
           <a:custGeom>
             <a:avLst/>
@@ -3743,234 +3745,6 @@
           </a:p>
         </p:txBody>
       </p:sp>
-      <p:grpSp>
-        <p:nvGrpSpPr>
-          <p:cNvPr id="17" name="Agrupar 16">
-            <a:extLst>
-              <a:ext uri="{FF2B5EF4-FFF2-40B4-BE49-F238E27FC236}">
-                <a16:creationId xmlns:a16="http://schemas.microsoft.com/office/drawing/2014/main" id="{ED6F6509-961E-1B0D-1646-ED5F21FDC5AC}"/>
-              </a:ext>
-            </a:extLst>
-          </p:cNvPr>
-          <p:cNvGrpSpPr/>
-          <p:nvPr/>
-        </p:nvGrpSpPr>
-        <p:grpSpPr>
-          <a:xfrm>
-            <a:off x="2033342" y="1195218"/>
-            <a:ext cx="901794" cy="136056"/>
-            <a:chOff x="2213956" y="1071790"/>
-            <a:chExt cx="981090" cy="136056"/>
-          </a:xfrm>
-        </p:grpSpPr>
-        <p:sp>
-          <p:nvSpPr>
-            <p:cNvPr id="6" name="Freeform 6"/>
-            <p:cNvSpPr>
-              <a:spLocks noChangeAspect="1"/>
-            </p:cNvSpPr>
-            <p:nvPr/>
-          </p:nvSpPr>
-          <p:spPr>
-            <a:xfrm>
-              <a:off x="2213956" y="1071790"/>
-              <a:ext cx="136056" cy="136056"/>
-            </a:xfrm>
-            <a:custGeom>
-              <a:avLst/>
-              <a:gdLst/>
-              <a:ahLst/>
-              <a:cxnLst/>
-              <a:rect l="l" t="t" r="r" b="b"/>
-              <a:pathLst>
-                <a:path w="106499" h="106499">
-                  <a:moveTo>
-                    <a:pt x="0" y="0"/>
-                  </a:moveTo>
-                  <a:lnTo>
-                    <a:pt x="106499" y="0"/>
-                  </a:lnTo>
-                  <a:lnTo>
-                    <a:pt x="106499" y="106499"/>
-                  </a:lnTo>
-                  <a:lnTo>
-                    <a:pt x="0" y="106499"/>
-                  </a:lnTo>
-                  <a:lnTo>
-                    <a:pt x="0" y="0"/>
-                  </a:lnTo>
-                  <a:close/>
-                </a:path>
-              </a:pathLst>
-            </a:custGeom>
-            <a:blipFill>
-              <a:blip r:embed="rId5"/>
-              <a:stretch>
-                <a:fillRect/>
-              </a:stretch>
-            </a:blipFill>
-          </p:spPr>
-          <p:txBody>
-            <a:bodyPr/>
-            <a:lstStyle/>
-            <a:p>
-              <a:endParaRPr sz="1047"/>
-            </a:p>
-          </p:txBody>
-        </p:sp>
-        <p:sp>
-          <p:nvSpPr>
-            <p:cNvPr id="11" name="TextBox 11"/>
-            <p:cNvSpPr txBox="1"/>
-            <p:nvPr/>
-          </p:nvSpPr>
-          <p:spPr>
-            <a:xfrm>
-              <a:off x="2353725" y="1135041"/>
-              <a:ext cx="841321" cy="56362"/>
-            </a:xfrm>
-            <a:prstGeom prst="rect">
-              <a:avLst/>
-            </a:prstGeom>
-          </p:spPr>
-          <p:txBody>
-            <a:bodyPr wrap="square" lIns="0" tIns="0" rIns="0" bIns="0" rtlCol="0" anchor="t">
-              <a:spAutoFit/>
-            </a:bodyPr>
-            <a:lstStyle/>
-            <a:p>
-              <a:pPr algn="ctr">
-                <a:lnSpc>
-                  <a:spcPts val="443"/>
-                </a:lnSpc>
-              </a:pPr>
-              <a:r>
-                <a:rPr lang="en-US" sz="719" spc="-3" dirty="0">
-                  <a:solidFill>
-                    <a:srgbClr val="000000"/>
-                  </a:solidFill>
-                  <a:latin typeface="Montserrat Classic"/>
-                </a:rPr>
-                <a:t>@SCHWARZ-SA</a:t>
-              </a:r>
-            </a:p>
-          </p:txBody>
-        </p:sp>
-      </p:grpSp>
-      <p:grpSp>
-        <p:nvGrpSpPr>
-          <p:cNvPr id="19" name="Agrupar 18">
-            <a:extLst>
-              <a:ext uri="{FF2B5EF4-FFF2-40B4-BE49-F238E27FC236}">
-                <a16:creationId xmlns:a16="http://schemas.microsoft.com/office/drawing/2014/main" id="{5EF80789-787C-E01F-0EBD-086844CF60F8}"/>
-              </a:ext>
-            </a:extLst>
-          </p:cNvPr>
-          <p:cNvGrpSpPr/>
-          <p:nvPr/>
-        </p:nvGrpSpPr>
-        <p:grpSpPr>
-          <a:xfrm>
-            <a:off x="3005242" y="1198564"/>
-            <a:ext cx="834689" cy="136056"/>
-            <a:chOff x="3135692" y="1073622"/>
-            <a:chExt cx="926924" cy="162201"/>
-          </a:xfrm>
-        </p:grpSpPr>
-        <p:sp>
-          <p:nvSpPr>
-            <p:cNvPr id="7" name="Freeform 7"/>
-            <p:cNvSpPr>
-              <a:spLocks noChangeAspect="1"/>
-            </p:cNvSpPr>
-            <p:nvPr/>
-          </p:nvSpPr>
-          <p:spPr>
-            <a:xfrm>
-              <a:off x="3135692" y="1073622"/>
-              <a:ext cx="137213" cy="162201"/>
-            </a:xfrm>
-            <a:custGeom>
-              <a:avLst/>
-              <a:gdLst/>
-              <a:ahLst/>
-              <a:cxnLst/>
-              <a:rect l="l" t="t" r="r" b="b"/>
-              <a:pathLst>
-                <a:path w="103082" h="103082">
-                  <a:moveTo>
-                    <a:pt x="0" y="0"/>
-                  </a:moveTo>
-                  <a:lnTo>
-                    <a:pt x="103083" y="0"/>
-                  </a:lnTo>
-                  <a:lnTo>
-                    <a:pt x="103083" y="103082"/>
-                  </a:lnTo>
-                  <a:lnTo>
-                    <a:pt x="0" y="103082"/>
-                  </a:lnTo>
-                  <a:lnTo>
-                    <a:pt x="0" y="0"/>
-                  </a:lnTo>
-                  <a:close/>
-                </a:path>
-              </a:pathLst>
-            </a:custGeom>
-            <a:blipFill>
-              <a:blip r:embed="rId6"/>
-              <a:stretch>
-                <a:fillRect/>
-              </a:stretch>
-            </a:blipFill>
-          </p:spPr>
-          <p:txBody>
-            <a:bodyPr/>
-            <a:lstStyle/>
-            <a:p>
-              <a:endParaRPr sz="1047"/>
-            </a:p>
-          </p:txBody>
-        </p:sp>
-        <p:sp>
-          <p:nvSpPr>
-            <p:cNvPr id="12" name="TextBox 12"/>
-            <p:cNvSpPr txBox="1"/>
-            <p:nvPr/>
-          </p:nvSpPr>
-          <p:spPr>
-            <a:xfrm>
-              <a:off x="3312048" y="1148352"/>
-              <a:ext cx="750568" cy="67192"/>
-            </a:xfrm>
-            <a:prstGeom prst="rect">
-              <a:avLst/>
-            </a:prstGeom>
-          </p:spPr>
-          <p:txBody>
-            <a:bodyPr wrap="square" lIns="0" tIns="0" rIns="0" bIns="0" rtlCol="0" anchor="t">
-              <a:spAutoFit/>
-            </a:bodyPr>
-            <a:lstStyle/>
-            <a:p>
-              <a:pPr>
-                <a:lnSpc>
-                  <a:spcPts val="443"/>
-                </a:lnSpc>
-              </a:pPr>
-              <a:r>
-                <a:rPr lang="en-US" sz="719" spc="-3" dirty="0">
-                  <a:solidFill>
-                    <a:srgbClr val="000000"/>
-                  </a:solidFill>
-                  <a:latin typeface="Montserrat Classic"/>
-                </a:rPr>
-                <a:t>/SCHWARZ.SA</a:t>
-              </a:r>
-            </a:p>
-          </p:txBody>
-        </p:sp>
-      </p:grpSp>
       <p:sp>
         <p:nvSpPr>
           <p:cNvPr id="13" name="TextBox 13"/>
@@ -3979,16 +3753,16 @@
         </p:nvSpPr>
         <p:spPr>
           <a:xfrm>
-            <a:off x="1439753" y="244475"/>
-            <a:ext cx="2483048" cy="234218"/>
+            <a:off x="1086835" y="168275"/>
+            <a:ext cx="2255057" cy="234218"/>
           </a:xfrm>
           <a:prstGeom prst="rect">
             <a:avLst/>
           </a:prstGeom>
         </p:spPr>
         <p:txBody>
-          <a:bodyPr wrap="square" lIns="0" tIns="0" rIns="0" bIns="0" rtlCol="0" anchor="t">
-            <a:normAutofit/>
+          <a:bodyPr wrap="square" lIns="0" tIns="0" rIns="0" bIns="0" rtlCol="0" anchor="ctr">
+            <a:noAutofit/>
           </a:bodyPr>
           <a:lstStyle/>
           <a:p>
@@ -4017,8 +3791,8 @@
         </p:nvSpPr>
         <p:spPr>
           <a:xfrm>
-            <a:off x="1440232" y="465337"/>
-            <a:ext cx="2596160" cy="89554"/>
+            <a:off x="1086033" y="464758"/>
+            <a:ext cx="2232000" cy="89554"/>
           </a:xfrm>
           <a:prstGeom prst="rect">
             <a:avLst/>
@@ -4026,7 +3800,7 @@
         </p:spPr>
         <p:txBody>
           <a:bodyPr wrap="square" lIns="0" tIns="0" rIns="0" bIns="0" rtlCol="0" anchor="t">
-            <a:normAutofit/>
+            <a:noAutofit/>
           </a:bodyPr>
           <a:lstStyle/>
           <a:p>
@@ -4040,7 +3814,7 @@
                 <a:solidFill>
                   <a:srgbClr val="000000"/>
                 </a:solidFill>
-                <a:latin typeface="Montserrat Semi-Bold Bold"/>
+                <a:latin typeface="Montserrat SemiBold" pitchFamily="2" charset="0"/>
               </a:rPr>
               <a:t>CARGOPT</a:t>
             </a:r>
@@ -4055,8 +3829,8 @@
         </p:nvSpPr>
         <p:spPr>
           <a:xfrm>
-            <a:off x="1440232" y="653945"/>
-            <a:ext cx="2567008" cy="109143"/>
+            <a:off x="1086835" y="655743"/>
+            <a:ext cx="2232000" cy="109143"/>
           </a:xfrm>
           <a:prstGeom prst="rect">
             <a:avLst/>
@@ -4064,30 +3838,215 @@
         </p:spPr>
         <p:txBody>
           <a:bodyPr wrap="square" lIns="0" tIns="0" rIns="0" bIns="0" rtlCol="0" anchor="t">
-            <a:normAutofit/>
+            <a:noAutofit/>
           </a:bodyPr>
-          <a:lstStyle/>
-          <a:p>
-            <a:pPr>
+          <a:lstStyle>
+            <a:defPPr>
+              <a:defRPr lang="en-US"/>
+            </a:defPPr>
+            <a:lvl1pPr>
               <a:lnSpc>
                 <a:spcPts val="643"/>
               </a:lnSpc>
-            </a:pPr>
-            <a:r>
-              <a:rPr lang="en-US" sz="863">
+              <a:defRPr sz="863">
                 <a:solidFill>
                   <a:srgbClr val="000000"/>
                 </a:solidFill>
-                <a:latin typeface="Montserrat Semi-Bold Bold"/>
+                <a:latin typeface="Montserrat SemiBold" pitchFamily="2" charset="0"/>
+              </a:defRPr>
+            </a:lvl1pPr>
+          </a:lstStyle>
+          <a:p>
+            <a:r>
+              <a:rPr lang="en-US" dirty="0"/>
+              <a:t>CARGOIN</a:t>
+            </a:r>
+          </a:p>
+        </p:txBody>
+      </p:sp>
+      <p:sp>
+        <p:nvSpPr>
+          <p:cNvPr id="6" name="Freeform 6"/>
+          <p:cNvSpPr>
+            <a:spLocks/>
+          </p:cNvSpPr>
+          <p:nvPr/>
+        </p:nvSpPr>
+        <p:spPr>
+          <a:xfrm>
+            <a:off x="1666285" y="1250675"/>
+            <a:ext cx="136800" cy="136800"/>
+          </a:xfrm>
+          <a:custGeom>
+            <a:avLst/>
+            <a:gdLst/>
+            <a:ahLst/>
+            <a:cxnLst/>
+            <a:rect l="l" t="t" r="r" b="b"/>
+            <a:pathLst>
+              <a:path w="106499" h="106499">
+                <a:moveTo>
+                  <a:pt x="0" y="0"/>
+                </a:moveTo>
+                <a:lnTo>
+                  <a:pt x="106499" y="0"/>
+                </a:lnTo>
+                <a:lnTo>
+                  <a:pt x="106499" y="106499"/>
+                </a:lnTo>
+                <a:lnTo>
+                  <a:pt x="0" y="106499"/>
+                </a:lnTo>
+                <a:lnTo>
+                  <a:pt x="0" y="0"/>
+                </a:lnTo>
+                <a:close/>
+              </a:path>
+            </a:pathLst>
+          </a:custGeom>
+          <a:blipFill>
+            <a:blip r:embed="rId5"/>
+            <a:stretch>
+              <a:fillRect/>
+            </a:stretch>
+          </a:blipFill>
+        </p:spPr>
+        <p:txBody>
+          <a:bodyPr/>
+          <a:lstStyle/>
+          <a:p>
+            <a:endParaRPr sz="1047"/>
+          </a:p>
+        </p:txBody>
+      </p:sp>
+      <p:sp>
+        <p:nvSpPr>
+          <p:cNvPr id="11" name="TextBox 11"/>
+          <p:cNvSpPr txBox="1"/>
+          <p:nvPr/>
+        </p:nvSpPr>
+        <p:spPr>
+          <a:xfrm>
+            <a:off x="1820839" y="1173840"/>
+            <a:ext cx="773321" cy="61235"/>
+          </a:xfrm>
+          <a:prstGeom prst="rect">
+            <a:avLst/>
+          </a:prstGeom>
+        </p:spPr>
+        <p:txBody>
+          <a:bodyPr wrap="square" lIns="0" tIns="0" rIns="0" bIns="0" rtlCol="0" anchor="t">
+            <a:spAutoFit/>
+          </a:bodyPr>
+          <a:lstStyle/>
+          <a:p>
+            <a:pPr algn="ctr">
+              <a:lnSpc>
+                <a:spcPts val="443"/>
+              </a:lnSpc>
+            </a:pPr>
+            <a:r>
+              <a:rPr lang="en-US" sz="680" spc="-3" dirty="0">
+                <a:solidFill>
+                  <a:srgbClr val="000000"/>
+                </a:solidFill>
+                <a:latin typeface="Montserrat Medium" pitchFamily="2" charset="0"/>
               </a:rPr>
-              <a:t>CARGOIN</a:t>
-            </a:r>
-            <a:endParaRPr lang="en-US" sz="863" dirty="0">
-              <a:solidFill>
-                <a:srgbClr val="000000"/>
-              </a:solidFill>
-              <a:latin typeface="Montserrat Semi-Bold Bold"/>
-            </a:endParaRPr>
+              <a:t>@SCHWARZ-SA</a:t>
+            </a:r>
+          </a:p>
+        </p:txBody>
+      </p:sp>
+      <p:sp>
+        <p:nvSpPr>
+          <p:cNvPr id="7" name="Freeform 7"/>
+          <p:cNvSpPr>
+            <a:spLocks/>
+          </p:cNvSpPr>
+          <p:nvPr/>
+        </p:nvSpPr>
+        <p:spPr>
+          <a:xfrm>
+            <a:off x="1666285" y="1098275"/>
+            <a:ext cx="136800" cy="136800"/>
+          </a:xfrm>
+          <a:custGeom>
+            <a:avLst/>
+            <a:gdLst/>
+            <a:ahLst/>
+            <a:cxnLst/>
+            <a:rect l="l" t="t" r="r" b="b"/>
+            <a:pathLst>
+              <a:path w="103082" h="103082">
+                <a:moveTo>
+                  <a:pt x="0" y="0"/>
+                </a:moveTo>
+                <a:lnTo>
+                  <a:pt x="103083" y="0"/>
+                </a:lnTo>
+                <a:lnTo>
+                  <a:pt x="103083" y="103082"/>
+                </a:lnTo>
+                <a:lnTo>
+                  <a:pt x="0" y="103082"/>
+                </a:lnTo>
+                <a:lnTo>
+                  <a:pt x="0" y="0"/>
+                </a:lnTo>
+                <a:close/>
+              </a:path>
+            </a:pathLst>
+          </a:custGeom>
+          <a:blipFill>
+            <a:blip r:embed="rId6"/>
+            <a:stretch>
+              <a:fillRect/>
+            </a:stretch>
+          </a:blipFill>
+        </p:spPr>
+        <p:txBody>
+          <a:bodyPr/>
+          <a:lstStyle/>
+          <a:p>
+            <a:endParaRPr sz="1047"/>
+          </a:p>
+        </p:txBody>
+      </p:sp>
+      <p:sp>
+        <p:nvSpPr>
+          <p:cNvPr id="12" name="TextBox 12"/>
+          <p:cNvSpPr txBox="1"/>
+          <p:nvPr/>
+        </p:nvSpPr>
+        <p:spPr>
+          <a:xfrm>
+            <a:off x="1855961" y="1326240"/>
+            <a:ext cx="675882" cy="61235"/>
+          </a:xfrm>
+          <a:prstGeom prst="rect">
+            <a:avLst/>
+          </a:prstGeom>
+        </p:spPr>
+        <p:txBody>
+          <a:bodyPr wrap="square" lIns="0" tIns="0" rIns="0" bIns="0" rtlCol="0" anchor="t">
+            <a:spAutoFit/>
+          </a:bodyPr>
+          <a:lstStyle/>
+          <a:p>
+            <a:pPr>
+              <a:lnSpc>
+                <a:spcPts val="443"/>
+              </a:lnSpc>
+            </a:pPr>
+            <a:r>
+              <a:rPr lang="en-US" sz="680" spc="-3" dirty="0">
+                <a:solidFill>
+                  <a:srgbClr val="000000"/>
+                </a:solidFill>
+                <a:latin typeface="Montserrat Medium" pitchFamily="2" charset="0"/>
+              </a:rPr>
+              <a:t>/SCHWARZ.SA</a:t>
+            </a:r>
           </a:p>
         </p:txBody>
       </p:sp>
@@ -4099,7 +4058,7 @@
         </p:nvSpPr>
         <p:spPr>
           <a:xfrm>
-            <a:off x="2211063" y="815536"/>
+            <a:off x="1858145" y="815536"/>
             <a:ext cx="1187726" cy="115673"/>
           </a:xfrm>
           <a:prstGeom prst="rect">
@@ -4118,7 +4077,7 @@
               </a:lnSpc>
             </a:pPr>
             <a:r>
-              <a:rPr lang="en-US" sz="1100" dirty="0">
+              <a:rPr lang="en-US" sz="1000" dirty="0">
                 <a:solidFill>
                   <a:srgbClr val="000000"/>
                 </a:solidFill>
@@ -4139,8 +4098,8 @@
         </p:nvSpPr>
         <p:spPr>
           <a:xfrm>
-            <a:off x="2023370" y="780822"/>
-            <a:ext cx="150387" cy="150387"/>
+            <a:off x="1670452" y="780822"/>
+            <a:ext cx="136800" cy="136800"/>
           </a:xfrm>
           <a:custGeom>
             <a:avLst/>
@@ -4198,7 +4157,7 @@
         </p:nvSpPr>
         <p:spPr>
           <a:xfrm>
-            <a:off x="1466951" y="798285"/>
+            <a:off x="1083477" y="900257"/>
             <a:ext cx="439767" cy="415545"/>
           </a:xfrm>
           <a:custGeom>
@@ -4245,10 +4204,10 @@
       </p:sp>
       <p:pic>
         <p:nvPicPr>
-          <p:cNvPr id="20" name="Imagem 19" descr="Placa vermelha com letras brancas&#10;&#10;Descrição gerada automaticamente com confiança baixa">
+          <p:cNvPr id="21" name="Gráfico 20">
             <a:extLst>
               <a:ext uri="{FF2B5EF4-FFF2-40B4-BE49-F238E27FC236}">
-                <a16:creationId xmlns:a16="http://schemas.microsoft.com/office/drawing/2014/main" id="{0FCC201E-4E25-83B9-5A9E-E7DA5CC72D6B}"/>
+                <a16:creationId xmlns:a16="http://schemas.microsoft.com/office/drawing/2014/main" id="{2BA9B8A8-B126-8CE5-CF9F-763DB3F0B5C7}"/>
               </a:ext>
             </a:extLst>
           </p:cNvPr>
@@ -4258,7 +4217,78 @@
           <p:nvPr/>
         </p:nvPicPr>
         <p:blipFill>
-          <a:blip r:embed="rId9" cstate="print">
+          <a:blip r:embed="rId9">
+            <a:extLst>
+              <a:ext uri="{96DAC541-7B7A-43D3-8B79-37D633B846F1}">
+                <asvg:svgBlip xmlns:asvg="http://schemas.microsoft.com/office/drawing/2016/SVG/main" r:embed="rId10"/>
+              </a:ext>
+            </a:extLst>
+          </a:blip>
+          <a:srcRect l="4995" t="3878" r="51118" b="1934"/>
+          <a:stretch/>
+        </p:blipFill>
+        <p:spPr>
+          <a:xfrm>
+            <a:off x="4126887" y="-10269"/>
+            <a:ext cx="846012" cy="1411682"/>
+          </a:xfrm>
+          <a:prstGeom prst="rect">
+            <a:avLst/>
+          </a:prstGeom>
+        </p:spPr>
+      </p:pic>
+      <p:pic>
+        <p:nvPicPr>
+          <p:cNvPr id="20" name="Gráfico 19">
+            <a:extLst>
+              <a:ext uri="{FF2B5EF4-FFF2-40B4-BE49-F238E27FC236}">
+                <a16:creationId xmlns:a16="http://schemas.microsoft.com/office/drawing/2014/main" id="{8C506DFA-2EEA-852A-B7D7-D8636207B555}"/>
+              </a:ext>
+            </a:extLst>
+          </p:cNvPr>
+          <p:cNvPicPr>
+            <a:picLocks noChangeAspect="1"/>
+          </p:cNvPicPr>
+          <p:nvPr/>
+        </p:nvPicPr>
+        <p:blipFill>
+          <a:blip r:embed="rId11">
+            <a:extLst>
+              <a:ext uri="{96DAC541-7B7A-43D3-8B79-37D633B846F1}">
+                <asvg:svgBlip xmlns:asvg="http://schemas.microsoft.com/office/drawing/2016/SVG/main" r:embed="rId12"/>
+              </a:ext>
+            </a:extLst>
+          </a:blip>
+          <a:stretch>
+            <a:fillRect/>
+          </a:stretch>
+        </p:blipFill>
+        <p:spPr>
+          <a:xfrm>
+            <a:off x="3346926" y="-12114"/>
+            <a:ext cx="802229" cy="1411682"/>
+          </a:xfrm>
+          <a:prstGeom prst="rect">
+            <a:avLst/>
+          </a:prstGeom>
+        </p:spPr>
+      </p:pic>
+      <p:pic>
+        <p:nvPicPr>
+          <p:cNvPr id="9" name="Imagem 8" descr="Forma&#10;&#10;Descrição gerada automaticamente com confiança baixa">
+            <a:extLst>
+              <a:ext uri="{FF2B5EF4-FFF2-40B4-BE49-F238E27FC236}">
+                <a16:creationId xmlns:a16="http://schemas.microsoft.com/office/drawing/2014/main" id="{A6D56A4A-6CA1-0A0B-250D-1D921970DF5E}"/>
+              </a:ext>
+            </a:extLst>
+          </p:cNvPr>
+          <p:cNvPicPr>
+            <a:picLocks noChangeAspect="1"/>
+          </p:cNvPicPr>
+          <p:nvPr/>
+        </p:nvPicPr>
+        <p:blipFill>
+          <a:blip r:embed="rId13" cstate="print">
             <a:extLst>
               <a:ext uri="{28A0092B-C50C-407E-A947-70E740481C1C}">
                 <a14:useLocalDpi xmlns:a14="http://schemas.microsoft.com/office/drawing/2010/main" val="0"/>
@@ -4271,56 +4301,20 @@
         </p:blipFill>
         <p:spPr>
           <a:xfrm>
-            <a:off x="4054687" y="-8332"/>
-            <a:ext cx="792143" cy="1376208"/>
+            <a:off x="1659979" y="940848"/>
+            <a:ext cx="136800" cy="136800"/>
           </a:xfrm>
           <a:prstGeom prst="rect">
             <a:avLst/>
           </a:prstGeom>
         </p:spPr>
       </p:pic>
-      <p:pic>
-        <p:nvPicPr>
-          <p:cNvPr id="21" name="Imagem 20" descr="Forma&#10;&#10;Descrição gerada automaticamente com confiança baixa">
+      <p:sp>
+        <p:nvSpPr>
+          <p:cNvPr id="17" name="TextBox 10">
             <a:extLst>
               <a:ext uri="{FF2B5EF4-FFF2-40B4-BE49-F238E27FC236}">
-                <a16:creationId xmlns:a16="http://schemas.microsoft.com/office/drawing/2014/main" id="{8C5A2D1D-BCE2-4736-94AC-9B3C3F19BF25}"/>
-              </a:ext>
-            </a:extLst>
-          </p:cNvPr>
-          <p:cNvPicPr>
-            <a:picLocks noChangeAspect="1"/>
-          </p:cNvPicPr>
-          <p:nvPr/>
-        </p:nvPicPr>
-        <p:blipFill>
-          <a:blip r:embed="rId10" cstate="print">
-            <a:extLst>
-              <a:ext uri="{28A0092B-C50C-407E-A947-70E740481C1C}">
-                <a14:useLocalDpi xmlns:a14="http://schemas.microsoft.com/office/drawing/2010/main" val="0"/>
-              </a:ext>
-            </a:extLst>
-          </a:blip>
-          <a:stretch>
-            <a:fillRect/>
-          </a:stretch>
-        </p:blipFill>
-        <p:spPr>
-          <a:xfrm>
-            <a:off x="2003833" y="970248"/>
-            <a:ext cx="181141" cy="181141"/>
-          </a:xfrm>
-          <a:prstGeom prst="rect">
-            <a:avLst/>
-          </a:prstGeom>
-        </p:spPr>
-      </p:pic>
-      <p:sp>
-        <p:nvSpPr>
-          <p:cNvPr id="22" name="TextBox 10">
-            <a:extLst>
-              <a:ext uri="{FF2B5EF4-FFF2-40B4-BE49-F238E27FC236}">
-                <a16:creationId xmlns:a16="http://schemas.microsoft.com/office/drawing/2014/main" id="{BF2E1357-3E3E-876A-6DDB-9C4A688E4F5D}"/>
+                <a16:creationId xmlns:a16="http://schemas.microsoft.com/office/drawing/2014/main" id="{6166B812-585D-4467-3C30-8E8A82BADC1F}"/>
               </a:ext>
             </a:extLst>
           </p:cNvPr>
@@ -4329,7 +4323,7 @@
         </p:nvSpPr>
         <p:spPr>
           <a:xfrm>
-            <a:off x="2211063" y="1034329"/>
+            <a:off x="1863482" y="979338"/>
             <a:ext cx="1187726" cy="115673"/>
           </a:xfrm>
           <a:prstGeom prst="rect">
@@ -4348,7 +4342,7 @@
               </a:lnSpc>
             </a:pPr>
             <a:r>
-              <a:rPr lang="en-US" sz="1100" dirty="0">
+              <a:rPr lang="en-US" sz="1000" dirty="0">
                 <a:solidFill>
                   <a:srgbClr val="000000"/>
                 </a:solidFill>

</xml_diff>